<commit_message>
Last update. Updated Final Report PDF and PP with ROC curve. Added key takeaways.
</commit_message>
<xml_diff>
--- a/Final Project Files/Reports/sb_capstone_final.pptx
+++ b/Final Project Files/Reports/sb_capstone_final.pptx
@@ -5,7 +5,7 @@
     <p:sldMasterId id="2147483648" r:id="rId1"/>
   </p:sldMasterIdLst>
   <p:notesMasterIdLst>
-    <p:notesMasterId r:id="rId20"/>
+    <p:notesMasterId r:id="rId21"/>
   </p:notesMasterIdLst>
   <p:sldIdLst>
     <p:sldId id="256" r:id="rId2"/>
@@ -23,14 +23,15 @@
     <p:sldId id="268" r:id="rId14"/>
     <p:sldId id="270" r:id="rId15"/>
     <p:sldId id="269" r:id="rId16"/>
-    <p:sldId id="271" r:id="rId17"/>
-    <p:sldId id="272" r:id="rId18"/>
-    <p:sldId id="273" r:id="rId19"/>
+    <p:sldId id="274" r:id="rId17"/>
+    <p:sldId id="271" r:id="rId18"/>
+    <p:sldId id="272" r:id="rId19"/>
+    <p:sldId id="273" r:id="rId20"/>
   </p:sldIdLst>
   <p:sldSz cx="12192000" cy="6858000"/>
   <p:notesSz cx="6858000" cy="9144000"/>
   <p:custDataLst>
-    <p:tags r:id="rId21"/>
+    <p:tags r:id="rId22"/>
   </p:custDataLst>
   <p:defaultTextStyle>
     <a:defPPr>
@@ -221,7 +222,7 @@
           <a:p>
             <a:fld id="{54B0C0D3-9A2E-4951-A4A9-421EFEC22E1C}" type="datetimeFigureOut">
               <a:rPr lang="en-US" smtClean="0"/>
-              <a:t>1/18/2018</a:t>
+              <a:t>1/21/2018</a:t>
             </a:fld>
             <a:endParaRPr lang="en-US"/>
           </a:p>
@@ -1037,6 +1038,90 @@
 </p:notes>
 </file>
 
+<file path=ppt/notesSlides/notesSlide15.xml><?xml version="1.0" encoding="utf-8"?>
+<p:notes xmlns:a="http://schemas.openxmlformats.org/drawingml/2006/main" xmlns:r="http://schemas.openxmlformats.org/officeDocument/2006/relationships" xmlns:p="http://schemas.openxmlformats.org/presentationml/2006/main">
+  <p:cSld>
+    <p:spTree>
+      <p:nvGrpSpPr>
+        <p:cNvPr id="1" name=""/>
+        <p:cNvGrpSpPr/>
+        <p:nvPr/>
+      </p:nvGrpSpPr>
+      <p:grpSpPr>
+        <a:xfrm>
+          <a:off x="0" y="0"/>
+          <a:ext cx="0" cy="0"/>
+          <a:chOff x="0" y="0"/>
+          <a:chExt cx="0" cy="0"/>
+        </a:xfrm>
+      </p:grpSpPr>
+      <p:sp>
+        <p:nvSpPr>
+          <p:cNvPr id="2" name="Slide Image Placeholder 1"/>
+          <p:cNvSpPr>
+            <a:spLocks noGrp="1" noRot="1" noChangeAspect="1"/>
+          </p:cNvSpPr>
+          <p:nvPr>
+            <p:ph type="sldImg"/>
+          </p:nvPr>
+        </p:nvSpPr>
+        <p:spPr/>
+      </p:sp>
+      <p:sp>
+        <p:nvSpPr>
+          <p:cNvPr id="3" name="Notes Placeholder 2"/>
+          <p:cNvSpPr>
+            <a:spLocks noGrp="1"/>
+          </p:cNvSpPr>
+          <p:nvPr>
+            <p:ph type="body" idx="1"/>
+          </p:nvPr>
+        </p:nvSpPr>
+        <p:spPr/>
+        <p:txBody>
+          <a:bodyPr/>
+          <a:lstStyle/>
+          <a:p>
+            <a:endParaRPr lang="en-US" dirty="0"/>
+          </a:p>
+        </p:txBody>
+      </p:sp>
+      <p:sp>
+        <p:nvSpPr>
+          <p:cNvPr id="4" name="Slide Number Placeholder 3"/>
+          <p:cNvSpPr>
+            <a:spLocks noGrp="1"/>
+          </p:cNvSpPr>
+          <p:nvPr>
+            <p:ph type="sldNum" sz="quarter" idx="10"/>
+          </p:nvPr>
+        </p:nvSpPr>
+        <p:spPr/>
+        <p:txBody>
+          <a:bodyPr/>
+          <a:lstStyle/>
+          <a:p>
+            <a:fld id="{CCBF6388-C244-4578-9CBB-23AA19B32D2C}" type="slidenum">
+              <a:rPr lang="en-US" smtClean="0"/>
+              <a:t>16</a:t>
+            </a:fld>
+            <a:endParaRPr lang="en-US"/>
+          </a:p>
+        </p:txBody>
+      </p:sp>
+    </p:spTree>
+    <p:extLst>
+      <p:ext uri="{BB962C8B-B14F-4D97-AF65-F5344CB8AC3E}">
+        <p14:creationId xmlns:p14="http://schemas.microsoft.com/office/powerpoint/2010/main" val="3662160749"/>
+      </p:ext>
+    </p:extLst>
+  </p:cSld>
+  <p:clrMapOvr>
+    <a:masterClrMapping/>
+  </p:clrMapOvr>
+</p:notes>
+</file>
+
 <file path=ppt/notesSlides/notesSlide2.xml><?xml version="1.0" encoding="utf-8"?>
 <p:notes xmlns:a="http://schemas.openxmlformats.org/drawingml/2006/main" xmlns:r="http://schemas.openxmlformats.org/officeDocument/2006/relationships" xmlns:p="http://schemas.openxmlformats.org/presentationml/2006/main">
   <p:cSld>
@@ -2044,7 +2129,7 @@
           <a:p>
             <a:fld id="{68846EBE-D543-482F-8CBA-92C496FC604D}" type="datetimeFigureOut">
               <a:rPr lang="en-US" smtClean="0"/>
-              <a:t>1/18/2018</a:t>
+              <a:t>1/21/2018</a:t>
             </a:fld>
             <a:endParaRPr lang="en-US" dirty="0"/>
           </a:p>
@@ -2242,7 +2327,7 @@
           <a:p>
             <a:fld id="{68846EBE-D543-482F-8CBA-92C496FC604D}" type="datetimeFigureOut">
               <a:rPr lang="en-US" smtClean="0"/>
-              <a:t>1/18/2018</a:t>
+              <a:t>1/21/2018</a:t>
             </a:fld>
             <a:endParaRPr lang="en-US" dirty="0"/>
           </a:p>
@@ -2450,7 +2535,7 @@
           <a:p>
             <a:fld id="{68846EBE-D543-482F-8CBA-92C496FC604D}" type="datetimeFigureOut">
               <a:rPr lang="en-US" smtClean="0"/>
-              <a:t>1/18/2018</a:t>
+              <a:t>1/21/2018</a:t>
             </a:fld>
             <a:endParaRPr lang="en-US" dirty="0"/>
           </a:p>
@@ -2648,7 +2733,7 @@
           <a:p>
             <a:fld id="{68846EBE-D543-482F-8CBA-92C496FC604D}" type="datetimeFigureOut">
               <a:rPr lang="en-US" smtClean="0"/>
-              <a:t>1/18/2018</a:t>
+              <a:t>1/21/2018</a:t>
             </a:fld>
             <a:endParaRPr lang="en-US" dirty="0"/>
           </a:p>
@@ -2923,7 +3008,7 @@
           <a:p>
             <a:fld id="{68846EBE-D543-482F-8CBA-92C496FC604D}" type="datetimeFigureOut">
               <a:rPr lang="en-US" smtClean="0"/>
-              <a:t>1/18/2018</a:t>
+              <a:t>1/21/2018</a:t>
             </a:fld>
             <a:endParaRPr lang="en-US" dirty="0"/>
           </a:p>
@@ -3188,7 +3273,7 @@
           <a:p>
             <a:fld id="{68846EBE-D543-482F-8CBA-92C496FC604D}" type="datetimeFigureOut">
               <a:rPr lang="en-US" smtClean="0"/>
-              <a:t>1/18/2018</a:t>
+              <a:t>1/21/2018</a:t>
             </a:fld>
             <a:endParaRPr lang="en-US" dirty="0"/>
           </a:p>
@@ -3600,7 +3685,7 @@
           <a:p>
             <a:fld id="{68846EBE-D543-482F-8CBA-92C496FC604D}" type="datetimeFigureOut">
               <a:rPr lang="en-US" smtClean="0"/>
-              <a:t>1/18/2018</a:t>
+              <a:t>1/21/2018</a:t>
             </a:fld>
             <a:endParaRPr lang="en-US" dirty="0"/>
           </a:p>
@@ -3741,7 +3826,7 @@
           <a:p>
             <a:fld id="{68846EBE-D543-482F-8CBA-92C496FC604D}" type="datetimeFigureOut">
               <a:rPr lang="en-US" smtClean="0"/>
-              <a:t>1/18/2018</a:t>
+              <a:t>1/21/2018</a:t>
             </a:fld>
             <a:endParaRPr lang="en-US" dirty="0"/>
           </a:p>
@@ -3854,7 +3939,7 @@
           <a:p>
             <a:fld id="{68846EBE-D543-482F-8CBA-92C496FC604D}" type="datetimeFigureOut">
               <a:rPr lang="en-US" smtClean="0"/>
-              <a:t>1/18/2018</a:t>
+              <a:t>1/21/2018</a:t>
             </a:fld>
             <a:endParaRPr lang="en-US" dirty="0"/>
           </a:p>
@@ -4165,7 +4250,7 @@
           <a:p>
             <a:fld id="{68846EBE-D543-482F-8CBA-92C496FC604D}" type="datetimeFigureOut">
               <a:rPr lang="en-US" smtClean="0"/>
-              <a:t>1/18/2018</a:t>
+              <a:t>1/21/2018</a:t>
             </a:fld>
             <a:endParaRPr lang="en-US" dirty="0"/>
           </a:p>
@@ -4453,7 +4538,7 @@
           <a:p>
             <a:fld id="{68846EBE-D543-482F-8CBA-92C496FC604D}" type="datetimeFigureOut">
               <a:rPr lang="en-US" smtClean="0"/>
-              <a:t>1/18/2018</a:t>
+              <a:t>1/21/2018</a:t>
             </a:fld>
             <a:endParaRPr lang="en-US" dirty="0"/>
           </a:p>
@@ -4744,7 +4829,7 @@
           <a:p>
             <a:fld id="{68846EBE-D543-482F-8CBA-92C496FC604D}" type="datetimeFigureOut">
               <a:rPr lang="en-US" smtClean="0"/>
-              <a:t>1/18/2018</a:t>
+              <a:t>1/21/2018</a:t>
             </a:fld>
             <a:endParaRPr lang="en-US" dirty="0"/>
           </a:p>
@@ -6667,7 +6752,7 @@
           <p:cNvPr id="2" name="Title 1">
             <a:extLst>
               <a:ext uri="{FF2B5EF4-FFF2-40B4-BE49-F238E27FC236}">
-                <a16:creationId xmlns:a16="http://schemas.microsoft.com/office/drawing/2014/main" id="{01ACF26A-3D6A-4AA0-9499-4D4EEFA1566A}"/>
+                <a16:creationId xmlns:a16="http://schemas.microsoft.com/office/drawing/2014/main" id="{853607F6-EE80-4C87-9FCC-FE6B4ECE644F}"/>
               </a:ext>
             </a:extLst>
           </p:cNvPr>
@@ -6685,7 +6770,7 @@
           <a:p>
             <a:r>
               <a:rPr lang="en-US" dirty="0"/>
-              <a:t>Flaws of Negative Sentiment Predictor</a:t>
+              <a:t>Negative Sentiment Predictor Results</a:t>
             </a:r>
           </a:p>
         </p:txBody>
@@ -6695,15 +6780,15 @@
           <p:cNvPr id="3" name="Content Placeholder 2">
             <a:extLst>
               <a:ext uri="{FF2B5EF4-FFF2-40B4-BE49-F238E27FC236}">
-                <a16:creationId xmlns:a16="http://schemas.microsoft.com/office/drawing/2014/main" id="{05DAFD5E-294D-4417-902F-A36AA32CABA4}"/>
-              </a:ext>
-            </a:extLst>
-          </p:cNvPr>
-          <p:cNvSpPr>
-            <a:spLocks noGrp="1"/>
-          </p:cNvSpPr>
-          <p:nvPr>
-            <p:ph idx="1"/>
+                <a16:creationId xmlns:a16="http://schemas.microsoft.com/office/drawing/2014/main" id="{566CB009-EEB7-4380-BACE-43C2D43B077A}"/>
+              </a:ext>
+            </a:extLst>
+          </p:cNvPr>
+          <p:cNvSpPr>
+            <a:spLocks noGrp="1"/>
+          </p:cNvSpPr>
+          <p:nvPr>
+            <p:ph sz="half" idx="1"/>
           </p:nvPr>
         </p:nvSpPr>
         <p:spPr/>
@@ -6716,15 +6801,246 @@
             </a:pPr>
             <a:r>
               <a:rPr lang="en-US" dirty="0"/>
-              <a:t>This algorithm does not use actual customer service reports, which may provide different results. Additionally this algorithm does not detect sarcasm nor does it capture the language of Overwatch. Words like ‘Kill’ or ‘Mercy’ which can be seen as negative or positive respectively are normally neutral in the context in Overwatch. </a:t>
-            </a:r>
-          </a:p>
-        </p:txBody>
-      </p:sp>
+              <a:t>With an 83% accuracy, we have a false positive rate of about 2%</a:t>
+            </a:r>
+          </a:p>
+          <a:p>
+            <a:pPr marL="0" indent="0">
+              <a:buNone/>
+            </a:pPr>
+            <a:endParaRPr lang="en-US" dirty="0"/>
+          </a:p>
+          <a:p>
+            <a:pPr marL="0" indent="0">
+              <a:buNone/>
+            </a:pPr>
+            <a:r>
+              <a:rPr lang="en-US" dirty="0"/>
+              <a:t>We have a choice with making the model more or less accurate at the cost of incorrectly identifying positive sentiment as negative</a:t>
+            </a:r>
+          </a:p>
+        </p:txBody>
+      </p:sp>
+      <p:sp>
+        <p:nvSpPr>
+          <p:cNvPr id="8" name="Content Placeholder 7">
+            <a:extLst>
+              <a:ext uri="{FF2B5EF4-FFF2-40B4-BE49-F238E27FC236}">
+                <a16:creationId xmlns:a16="http://schemas.microsoft.com/office/drawing/2014/main" id="{E473F350-2629-44E4-A761-0E05250796C4}"/>
+              </a:ext>
+            </a:extLst>
+          </p:cNvPr>
+          <p:cNvSpPr>
+            <a:spLocks noGrp="1"/>
+          </p:cNvSpPr>
+          <p:nvPr>
+            <p:ph sz="half" idx="2"/>
+          </p:nvPr>
+        </p:nvSpPr>
+        <p:spPr/>
+        <p:txBody>
+          <a:bodyPr/>
+          <a:lstStyle/>
+          <a:p>
+            <a:pPr marL="0" indent="0">
+              <a:buNone/>
+            </a:pPr>
+            <a:r>
+              <a:rPr lang="en-US" dirty="0"/>
+              <a:t> </a:t>
+            </a:r>
+          </a:p>
+        </p:txBody>
+      </p:sp>
+      <p:pic>
+        <p:nvPicPr>
+          <p:cNvPr id="7" name="Picture 6">
+            <a:extLst>
+              <a:ext uri="{FF2B5EF4-FFF2-40B4-BE49-F238E27FC236}">
+                <a16:creationId xmlns:a16="http://schemas.microsoft.com/office/drawing/2014/main" id="{2CA022E9-2192-48B7-AC87-26ADB8E11E1F}"/>
+              </a:ext>
+            </a:extLst>
+          </p:cNvPr>
+          <p:cNvPicPr>
+            <a:picLocks noChangeAspect="1"/>
+          </p:cNvPicPr>
+          <p:nvPr/>
+        </p:nvPicPr>
+        <p:blipFill rotWithShape="1">
+          <a:blip r:embed="rId3">
+            <a:clrChange>
+              <a:clrFrom>
+                <a:srgbClr val="FFFFFF"/>
+              </a:clrFrom>
+              <a:clrTo>
+                <a:srgbClr val="FFFFFF">
+                  <a:alpha val="0"/>
+                </a:srgbClr>
+              </a:clrTo>
+            </a:clrChange>
+            <a:extLst>
+              <a:ext uri="{28A0092B-C50C-407E-A947-70E740481C1C}">
+                <a14:useLocalDpi xmlns:a14="http://schemas.microsoft.com/office/drawing/2010/main" val="0"/>
+              </a:ext>
+            </a:extLst>
+          </a:blip>
+          <a:srcRect t="4288" b="2978"/>
+          <a:stretch/>
+        </p:blipFill>
+        <p:spPr>
+          <a:xfrm>
+            <a:off x="6600463" y="1825625"/>
+            <a:ext cx="4511233" cy="4353541"/>
+          </a:xfrm>
+          <a:prstGeom prst="rect">
+            <a:avLst/>
+          </a:prstGeom>
+        </p:spPr>
+      </p:pic>
+      <p:sp>
+        <p:nvSpPr>
+          <p:cNvPr id="9" name="Oval 8">
+            <a:extLst>
+              <a:ext uri="{FF2B5EF4-FFF2-40B4-BE49-F238E27FC236}">
+                <a16:creationId xmlns:a16="http://schemas.microsoft.com/office/drawing/2014/main" id="{59CFB032-C816-4635-B9B5-9F3AD469D202}"/>
+              </a:ext>
+            </a:extLst>
+          </p:cNvPr>
+          <p:cNvSpPr/>
+          <p:nvPr/>
+        </p:nvSpPr>
+        <p:spPr>
+          <a:xfrm>
+            <a:off x="7917083" y="2766349"/>
+            <a:ext cx="289367" cy="266218"/>
+          </a:xfrm>
+          <a:prstGeom prst="ellipse">
+            <a:avLst/>
+          </a:prstGeom>
+          <a:noFill/>
+          <a:ln>
+            <a:solidFill>
+              <a:srgbClr val="FF0000"/>
+            </a:solidFill>
+          </a:ln>
+        </p:spPr>
+        <p:style>
+          <a:lnRef idx="2">
+            <a:schemeClr val="accent1">
+              <a:shade val="50000"/>
+            </a:schemeClr>
+          </a:lnRef>
+          <a:fillRef idx="1">
+            <a:schemeClr val="accent1"/>
+          </a:fillRef>
+          <a:effectRef idx="0">
+            <a:schemeClr val="accent1"/>
+          </a:effectRef>
+          <a:fontRef idx="minor">
+            <a:schemeClr val="lt1"/>
+          </a:fontRef>
+        </p:style>
+        <p:txBody>
+          <a:bodyPr rtlCol="0" anchor="ctr"/>
+          <a:lstStyle/>
+          <a:p>
+            <a:pPr algn="ctr"/>
+            <a:endParaRPr lang="en-US"/>
+          </a:p>
+        </p:txBody>
+      </p:sp>
+      <p:cxnSp>
+        <p:nvCxnSpPr>
+          <p:cNvPr id="11" name="Straight Connector 10">
+            <a:extLst>
+              <a:ext uri="{FF2B5EF4-FFF2-40B4-BE49-F238E27FC236}">
+                <a16:creationId xmlns:a16="http://schemas.microsoft.com/office/drawing/2014/main" id="{A694F7B4-EF19-4C17-AA9C-8C92FFD68689}"/>
+              </a:ext>
+            </a:extLst>
+          </p:cNvPr>
+          <p:cNvCxnSpPr>
+            <a:cxnSpLocks/>
+            <a:stCxn id="9" idx="4"/>
+          </p:cNvCxnSpPr>
+          <p:nvPr/>
+        </p:nvCxnSpPr>
+        <p:spPr>
+          <a:xfrm>
+            <a:off x="8061767" y="3032567"/>
+            <a:ext cx="0" cy="2430684"/>
+          </a:xfrm>
+          <a:prstGeom prst="line">
+            <a:avLst/>
+          </a:prstGeom>
+          <a:ln>
+            <a:solidFill>
+              <a:srgbClr val="FF0000"/>
+            </a:solidFill>
+          </a:ln>
+        </p:spPr>
+        <p:style>
+          <a:lnRef idx="1">
+            <a:schemeClr val="accent1"/>
+          </a:lnRef>
+          <a:fillRef idx="0">
+            <a:schemeClr val="accent1"/>
+          </a:fillRef>
+          <a:effectRef idx="0">
+            <a:schemeClr val="accent1"/>
+          </a:effectRef>
+          <a:fontRef idx="minor">
+            <a:schemeClr val="tx1"/>
+          </a:fontRef>
+        </p:style>
+      </p:cxnSp>
+      <p:cxnSp>
+        <p:nvCxnSpPr>
+          <p:cNvPr id="12" name="Straight Connector 11">
+            <a:extLst>
+              <a:ext uri="{FF2B5EF4-FFF2-40B4-BE49-F238E27FC236}">
+                <a16:creationId xmlns:a16="http://schemas.microsoft.com/office/drawing/2014/main" id="{7AB0FA6E-F096-4B11-9900-86E5B4B338F8}"/>
+              </a:ext>
+            </a:extLst>
+          </p:cNvPr>
+          <p:cNvCxnSpPr>
+            <a:cxnSpLocks/>
+            <a:stCxn id="9" idx="2"/>
+          </p:cNvCxnSpPr>
+          <p:nvPr/>
+        </p:nvCxnSpPr>
+        <p:spPr>
+          <a:xfrm flipH="1">
+            <a:off x="7303625" y="2899458"/>
+            <a:ext cx="613458" cy="0"/>
+          </a:xfrm>
+          <a:prstGeom prst="line">
+            <a:avLst/>
+          </a:prstGeom>
+          <a:ln>
+            <a:solidFill>
+              <a:srgbClr val="FF0000"/>
+            </a:solidFill>
+          </a:ln>
+        </p:spPr>
+        <p:style>
+          <a:lnRef idx="1">
+            <a:schemeClr val="accent1"/>
+          </a:lnRef>
+          <a:fillRef idx="0">
+            <a:schemeClr val="accent1"/>
+          </a:fillRef>
+          <a:effectRef idx="0">
+            <a:schemeClr val="accent1"/>
+          </a:effectRef>
+          <a:fontRef idx="minor">
+            <a:schemeClr val="tx1"/>
+          </a:fontRef>
+        </p:style>
+      </p:cxnSp>
     </p:spTree>
     <p:extLst>
       <p:ext uri="{BB962C8B-B14F-4D97-AF65-F5344CB8AC3E}">
-        <p14:creationId xmlns:p14="http://schemas.microsoft.com/office/powerpoint/2010/main" val="1184148998"/>
+        <p14:creationId xmlns:p14="http://schemas.microsoft.com/office/powerpoint/2010/main" val="2928733558"/>
       </p:ext>
     </p:extLst>
   </p:cSld>
@@ -6756,6 +7072,95 @@
           <p:cNvPr id="2" name="Title 1">
             <a:extLst>
               <a:ext uri="{FF2B5EF4-FFF2-40B4-BE49-F238E27FC236}">
+                <a16:creationId xmlns:a16="http://schemas.microsoft.com/office/drawing/2014/main" id="{01ACF26A-3D6A-4AA0-9499-4D4EEFA1566A}"/>
+              </a:ext>
+            </a:extLst>
+          </p:cNvPr>
+          <p:cNvSpPr>
+            <a:spLocks noGrp="1"/>
+          </p:cNvSpPr>
+          <p:nvPr>
+            <p:ph type="title"/>
+          </p:nvPr>
+        </p:nvSpPr>
+        <p:spPr/>
+        <p:txBody>
+          <a:bodyPr/>
+          <a:lstStyle/>
+          <a:p>
+            <a:r>
+              <a:rPr lang="en-US" dirty="0"/>
+              <a:t>Flaws of Negative Sentiment Predictor</a:t>
+            </a:r>
+          </a:p>
+        </p:txBody>
+      </p:sp>
+      <p:sp>
+        <p:nvSpPr>
+          <p:cNvPr id="3" name="Content Placeholder 2">
+            <a:extLst>
+              <a:ext uri="{FF2B5EF4-FFF2-40B4-BE49-F238E27FC236}">
+                <a16:creationId xmlns:a16="http://schemas.microsoft.com/office/drawing/2014/main" id="{05DAFD5E-294D-4417-902F-A36AA32CABA4}"/>
+              </a:ext>
+            </a:extLst>
+          </p:cNvPr>
+          <p:cNvSpPr>
+            <a:spLocks noGrp="1"/>
+          </p:cNvSpPr>
+          <p:nvPr>
+            <p:ph idx="1"/>
+          </p:nvPr>
+        </p:nvSpPr>
+        <p:spPr/>
+        <p:txBody>
+          <a:bodyPr/>
+          <a:lstStyle/>
+          <a:p>
+            <a:pPr marL="0" indent="0">
+              <a:buNone/>
+            </a:pPr>
+            <a:r>
+              <a:rPr lang="en-US" dirty="0"/>
+              <a:t>This algorithm does not use actual customer service reports, which may provide different results. Additionally this algorithm does not detect sarcasm nor does it capture the language of Overwatch. Words like ‘Kill’ or ‘Mercy’ which can be seen as negative or positive respectively are normally neutral in the context in Overwatch. </a:t>
+            </a:r>
+          </a:p>
+        </p:txBody>
+      </p:sp>
+    </p:spTree>
+    <p:extLst>
+      <p:ext uri="{BB962C8B-B14F-4D97-AF65-F5344CB8AC3E}">
+        <p14:creationId xmlns:p14="http://schemas.microsoft.com/office/powerpoint/2010/main" val="1184148998"/>
+      </p:ext>
+    </p:extLst>
+  </p:cSld>
+  <p:clrMapOvr>
+    <a:masterClrMapping/>
+  </p:clrMapOvr>
+</p:sld>
+</file>
+
+<file path=ppt/slides/slide18.xml><?xml version="1.0" encoding="utf-8"?>
+<p:sld xmlns:a="http://schemas.openxmlformats.org/drawingml/2006/main" xmlns:r="http://schemas.openxmlformats.org/officeDocument/2006/relationships" xmlns:p="http://schemas.openxmlformats.org/presentationml/2006/main">
+  <p:cSld>
+    <p:spTree>
+      <p:nvGrpSpPr>
+        <p:cNvPr id="1" name=""/>
+        <p:cNvGrpSpPr/>
+        <p:nvPr/>
+      </p:nvGrpSpPr>
+      <p:grpSpPr>
+        <a:xfrm>
+          <a:off x="0" y="0"/>
+          <a:ext cx="0" cy="0"/>
+          <a:chOff x="0" y="0"/>
+          <a:chExt cx="0" cy="0"/>
+        </a:xfrm>
+      </p:grpSpPr>
+      <p:sp>
+        <p:nvSpPr>
+          <p:cNvPr id="2" name="Title 1">
+            <a:extLst>
+              <a:ext uri="{FF2B5EF4-FFF2-40B4-BE49-F238E27FC236}">
                 <a16:creationId xmlns:a16="http://schemas.microsoft.com/office/drawing/2014/main" id="{D9701940-2476-41EC-8B7A-A38D447AB2F0}"/>
               </a:ext>
             </a:extLst>
@@ -6857,7 +7262,7 @@
 </p:sld>
 </file>
 
-<file path=ppt/slides/slide18.xml><?xml version="1.0" encoding="utf-8"?>
+<file path=ppt/slides/slide19.xml><?xml version="1.0" encoding="utf-8"?>
 <p:sld xmlns:a="http://schemas.openxmlformats.org/drawingml/2006/main" xmlns:r="http://schemas.openxmlformats.org/officeDocument/2006/relationships" xmlns:p="http://schemas.openxmlformats.org/presentationml/2006/main">
   <p:cSld>
     <p:spTree>

</xml_diff>